<commit_message>
Modification to UND-EFF figures
</commit_message>
<xml_diff>
--- a/manuscript/Figures/ProbFC_Knowledge_Effectiveness_Estimate.pptx
+++ b/manuscript/Figures/ProbFC_Knowledge_Effectiveness_Estimate.pptx
@@ -136,7 +136,7 @@
   <pc:docChgLst>
     <pc:chgData name="Fatima Pillosu" userId="a6295d4dc9e22643" providerId="LiveId" clId="{3117CC99-A8D8-4417-AA48-A79BC152B569}"/>
     <pc:docChg chg="undo custSel addSld delSld modSld sldOrd">
-      <pc:chgData name="Fatima Pillosu" userId="a6295d4dc9e22643" providerId="LiveId" clId="{3117CC99-A8D8-4417-AA48-A79BC152B569}" dt="2020-11-30T04:56:23.011" v="535" actId="2696"/>
+      <pc:chgData name="Fatima Pillosu" userId="a6295d4dc9e22643" providerId="LiveId" clId="{3117CC99-A8D8-4417-AA48-A79BC152B569}" dt="2020-11-30T05:40:35.302" v="545" actId="1038"/>
       <pc:docMkLst>
         <pc:docMk/>
       </pc:docMkLst>
@@ -1706,7 +1706,7 @@
         </pc:cxnChg>
       </pc:sldChg>
       <pc:sldChg chg="delSp modSp add ord">
-        <pc:chgData name="Fatima Pillosu" userId="a6295d4dc9e22643" providerId="LiveId" clId="{3117CC99-A8D8-4417-AA48-A79BC152B569}" dt="2020-11-30T04:55:09.163" v="534"/>
+        <pc:chgData name="Fatima Pillosu" userId="a6295d4dc9e22643" providerId="LiveId" clId="{3117CC99-A8D8-4417-AA48-A79BC152B569}" dt="2020-11-30T05:40:35.302" v="545" actId="1038"/>
         <pc:sldMkLst>
           <pc:docMk/>
           <pc:sldMk cId="142998642" sldId="260"/>
@@ -1719,6 +1719,14 @@
             <ac:spMk id="117" creationId="{D1C31FDC-53F8-4E0A-BD1F-75754661FE84}"/>
           </ac:spMkLst>
         </pc:spChg>
+        <pc:spChg chg="mod">
+          <ac:chgData name="Fatima Pillosu" userId="a6295d4dc9e22643" providerId="LiveId" clId="{3117CC99-A8D8-4417-AA48-A79BC152B569}" dt="2020-11-30T05:40:35.302" v="545" actId="1038"/>
+          <ac:spMkLst>
+            <pc:docMk/>
+            <pc:sldMk cId="142998642" sldId="260"/>
+            <ac:spMk id="151" creationId="{15FADE80-A39C-4E9F-85C7-24A19456D068}"/>
+          </ac:spMkLst>
+        </pc:spChg>
         <pc:spChg chg="del">
           <ac:chgData name="Fatima Pillosu" userId="a6295d4dc9e22643" providerId="LiveId" clId="{3117CC99-A8D8-4417-AA48-A79BC152B569}" dt="2020-11-30T04:54:36.561" v="524" actId="478"/>
           <ac:spMkLst>
@@ -1775,6 +1783,22 @@
             <ac:spMk id="168" creationId="{E516D3E9-1341-430B-B1E7-5B2EA93074B2}"/>
           </ac:spMkLst>
         </pc:spChg>
+        <pc:cxnChg chg="mod">
+          <ac:chgData name="Fatima Pillosu" userId="a6295d4dc9e22643" providerId="LiveId" clId="{3117CC99-A8D8-4417-AA48-A79BC152B569}" dt="2020-11-30T05:40:35.302" v="545" actId="1038"/>
+          <ac:cxnSpMkLst>
+            <pc:docMk/>
+            <pc:sldMk cId="142998642" sldId="260"/>
+            <ac:cxnSpMk id="149" creationId="{0D7C4CEF-49CD-4693-B536-8214DE9B278B}"/>
+          </ac:cxnSpMkLst>
+        </pc:cxnChg>
+        <pc:cxnChg chg="mod">
+          <ac:chgData name="Fatima Pillosu" userId="a6295d4dc9e22643" providerId="LiveId" clId="{3117CC99-A8D8-4417-AA48-A79BC152B569}" dt="2020-11-30T05:40:35.302" v="545" actId="1038"/>
+          <ac:cxnSpMkLst>
+            <pc:docMk/>
+            <pc:sldMk cId="142998642" sldId="260"/>
+            <ac:cxnSpMk id="150" creationId="{E6968A13-247B-406E-A618-8B4828738B85}"/>
+          </ac:cxnSpMkLst>
+        </pc:cxnChg>
         <pc:cxnChg chg="del">
           <ac:chgData name="Fatima Pillosu" userId="a6295d4dc9e22643" providerId="LiveId" clId="{3117CC99-A8D8-4417-AA48-A79BC152B569}" dt="2020-11-30T04:54:44.155" v="531" actId="478"/>
           <ac:cxnSpMkLst>
@@ -6093,7 +6117,7 @@
         </p:nvCxnSpPr>
         <p:spPr>
           <a:xfrm flipH="1" flipV="1">
-            <a:off x="1801912" y="1086827"/>
+            <a:off x="1832802" y="1086827"/>
             <a:ext cx="474422" cy="106839"/>
           </a:xfrm>
           <a:prstGeom prst="straightConnector1">
@@ -6138,7 +6162,7 @@
         </p:nvCxnSpPr>
         <p:spPr>
           <a:xfrm>
-            <a:off x="2270155" y="1190885"/>
+            <a:off x="2301045" y="1190885"/>
             <a:ext cx="677027" cy="0"/>
           </a:xfrm>
           <a:prstGeom prst="line">
@@ -6179,7 +6203,7 @@
         </p:nvSpPr>
         <p:spPr>
           <a:xfrm>
-            <a:off x="2186554" y="1028231"/>
+            <a:off x="2217444" y="1028231"/>
             <a:ext cx="1160049" cy="215444"/>
           </a:xfrm>
           <a:prstGeom prst="rect">

</xml_diff>